<commit_message>
changes to slides and exercise for UU workshop
</commit_message>
<xml_diff>
--- a/UU_april_2024/intro-to-multiverse.pptx
+++ b/UU_april_2024/intro-to-multiverse.pptx
@@ -8384,36 +8384,6 @@
           </a:p>
         </p:txBody>
       </p:sp>
-      <p:pic>
-        <p:nvPicPr>
-          <p:cNvPr id="7" name="Picture 6">
-            <a:extLst>
-              <a:ext uri="{FF2B5EF4-FFF2-40B4-BE49-F238E27FC236}">
-                <a16:creationId xmlns:a16="http://schemas.microsoft.com/office/drawing/2014/main" id="{2B9D2059-FCC0-6C5C-1B13-83FFBD277055}"/>
-              </a:ext>
-            </a:extLst>
-          </p:cNvPr>
-          <p:cNvPicPr>
-            <a:picLocks noChangeAspect="1"/>
-          </p:cNvPicPr>
-          <p:nvPr/>
-        </p:nvPicPr>
-        <p:blipFill>
-          <a:blip r:embed="rId2"/>
-          <a:stretch>
-            <a:fillRect/>
-          </a:stretch>
-        </p:blipFill>
-        <p:spPr>
-          <a:xfrm>
-            <a:off x="1818640" y="1116964"/>
-            <a:ext cx="5504019" cy="3692472"/>
-          </a:xfrm>
-          <a:prstGeom prst="rect">
-            <a:avLst/>
-          </a:prstGeom>
-        </p:spPr>
-      </p:pic>
       <p:sp>
         <p:nvSpPr>
           <p:cNvPr id="8" name="TextBox 7">
@@ -8461,10 +8431,106 @@
       </p:sp>
       <p:sp>
         <p:nvSpPr>
-          <p:cNvPr id="9" name="Oval 8">
+          <p:cNvPr id="11" name="TextBox 10">
             <a:extLst>
               <a:ext uri="{FF2B5EF4-FFF2-40B4-BE49-F238E27FC236}">
-                <a16:creationId xmlns:a16="http://schemas.microsoft.com/office/drawing/2014/main" id="{A0D18887-339A-9342-4398-C4A5269F11B2}"/>
+                <a16:creationId xmlns:a16="http://schemas.microsoft.com/office/drawing/2014/main" id="{A978BE89-8A24-C73C-4BA7-A8206E501BD1}"/>
+              </a:ext>
+            </a:extLst>
+          </p:cNvPr>
+          <p:cNvSpPr txBox="1"/>
+          <p:nvPr/>
+        </p:nvSpPr>
+        <p:spPr>
+          <a:xfrm>
+            <a:off x="396240" y="5293584"/>
+            <a:ext cx="10749280" cy="461665"/>
+          </a:xfrm>
+          <a:prstGeom prst="rect">
+            <a:avLst/>
+          </a:prstGeom>
+          <a:noFill/>
+        </p:spPr>
+        <p:txBody>
+          <a:bodyPr wrap="square">
+            <a:spAutoFit/>
+          </a:bodyPr>
+          <a:lstStyle/>
+          <a:p>
+            <a:pPr marL="0" indent="0">
+              <a:buNone/>
+            </a:pPr>
+            <a:r>
+              <a:rPr lang="en-GB" sz="2400" dirty="0">
+                <a:latin typeface="Helvetica" panose="020B0604020202020204" pitchFamily="34" charset="0"/>
+                <a:cs typeface="Helvetica" panose="020B0604020202020204" pitchFamily="34" charset="0"/>
+              </a:rPr>
+              <a:t>Step 3. Unzip folder, then double-click </a:t>
+            </a:r>
+            <a:r>
+              <a:rPr lang="en-GB" sz="2400" b="1" dirty="0">
+                <a:latin typeface="Helvetica" panose="020B0604020202020204" pitchFamily="34" charset="0"/>
+                <a:cs typeface="Helvetica" panose="020B0604020202020204" pitchFamily="34" charset="0"/>
+              </a:rPr>
+              <a:t>multiverse-</a:t>
+            </a:r>
+            <a:r>
+              <a:rPr lang="en-GB" sz="2400" b="1" dirty="0" err="1">
+                <a:latin typeface="Helvetica" panose="020B0604020202020204" pitchFamily="34" charset="0"/>
+                <a:cs typeface="Helvetica" panose="020B0604020202020204" pitchFamily="34" charset="0"/>
+              </a:rPr>
+              <a:t>workshop.Rproj</a:t>
+            </a:r>
+            <a:r>
+              <a:rPr lang="en-GB" sz="2400" dirty="0">
+                <a:latin typeface="Helvetica" panose="020B0604020202020204" pitchFamily="34" charset="0"/>
+                <a:cs typeface="Helvetica" panose="020B0604020202020204" pitchFamily="34" charset="0"/>
+              </a:rPr>
+              <a:t> </a:t>
+            </a:r>
+            <a:endParaRPr lang="LID4096" sz="2400" dirty="0">
+              <a:latin typeface="Helvetica" panose="020B0604020202020204" pitchFamily="34" charset="0"/>
+              <a:cs typeface="Helvetica" panose="020B0604020202020204" pitchFamily="34" charset="0"/>
+            </a:endParaRPr>
+          </a:p>
+        </p:txBody>
+      </p:sp>
+      <p:pic>
+        <p:nvPicPr>
+          <p:cNvPr id="6" name="Picture 5">
+            <a:extLst>
+              <a:ext uri="{FF2B5EF4-FFF2-40B4-BE49-F238E27FC236}">
+                <a16:creationId xmlns:a16="http://schemas.microsoft.com/office/drawing/2014/main" id="{02647696-0B07-5D1A-D0B7-ED4D2A7A72A4}"/>
+              </a:ext>
+            </a:extLst>
+          </p:cNvPr>
+          <p:cNvPicPr>
+            <a:picLocks noChangeAspect="1"/>
+          </p:cNvPicPr>
+          <p:nvPr/>
+        </p:nvPicPr>
+        <p:blipFill>
+          <a:blip r:embed="rId2"/>
+          <a:stretch>
+            <a:fillRect/>
+          </a:stretch>
+        </p:blipFill>
+        <p:spPr>
+          <a:xfrm>
+            <a:off x="1837683" y="1035574"/>
+            <a:ext cx="5242386" cy="4085065"/>
+          </a:xfrm>
+          <a:prstGeom prst="rect">
+            <a:avLst/>
+          </a:prstGeom>
+        </p:spPr>
+      </p:pic>
+      <p:sp>
+        <p:nvSpPr>
+          <p:cNvPr id="10" name="Oval 9">
+            <a:extLst>
+              <a:ext uri="{FF2B5EF4-FFF2-40B4-BE49-F238E27FC236}">
+                <a16:creationId xmlns:a16="http://schemas.microsoft.com/office/drawing/2014/main" id="{4C2BE378-206B-B0AF-A3D6-B42591F21B15}"/>
               </a:ext>
             </a:extLst>
           </p:cNvPr>
@@ -8473,59 +8539,7 @@
         </p:nvSpPr>
         <p:spPr>
           <a:xfrm>
-            <a:off x="2286000" y="4023360"/>
-            <a:ext cx="2164080" cy="325120"/>
-          </a:xfrm>
-          <a:prstGeom prst="ellipse">
-            <a:avLst/>
-          </a:prstGeom>
-          <a:noFill/>
-          <a:ln w="38100">
-            <a:solidFill>
-              <a:srgbClr val="FF0000"/>
-            </a:solidFill>
-          </a:ln>
-        </p:spPr>
-        <p:style>
-          <a:lnRef idx="2">
-            <a:schemeClr val="accent1">
-              <a:shade val="15000"/>
-            </a:schemeClr>
-          </a:lnRef>
-          <a:fillRef idx="1">
-            <a:schemeClr val="accent1"/>
-          </a:fillRef>
-          <a:effectRef idx="0">
-            <a:schemeClr val="accent1"/>
-          </a:effectRef>
-          <a:fontRef idx="minor">
-            <a:schemeClr val="lt1"/>
-          </a:fontRef>
-        </p:style>
-        <p:txBody>
-          <a:bodyPr rtlCol="0" anchor="ctr"/>
-          <a:lstStyle/>
-          <a:p>
-            <a:pPr algn="ctr"/>
-            <a:endParaRPr lang="LID4096"/>
-          </a:p>
-        </p:txBody>
-      </p:sp>
-      <p:sp>
-        <p:nvSpPr>
-          <p:cNvPr id="10" name="Oval 9">
-            <a:extLst>
-              <a:ext uri="{FF2B5EF4-FFF2-40B4-BE49-F238E27FC236}">
-                <a16:creationId xmlns:a16="http://schemas.microsoft.com/office/drawing/2014/main" id="{4C2BE378-206B-B0AF-A3D6-B42591F21B15}"/>
-              </a:ext>
-            </a:extLst>
-          </p:cNvPr>
-          <p:cNvSpPr/>
-          <p:nvPr/>
-        </p:nvSpPr>
-        <p:spPr>
-          <a:xfrm>
-            <a:off x="1940560" y="1885194"/>
+            <a:off x="1963057" y="1551203"/>
             <a:ext cx="1503680" cy="325120"/>
           </a:xfrm>
           <a:prstGeom prst="ellipse">
@@ -8565,67 +8579,53 @@
       </p:sp>
       <p:sp>
         <p:nvSpPr>
-          <p:cNvPr id="11" name="TextBox 10">
+          <p:cNvPr id="9" name="Oval 8">
             <a:extLst>
               <a:ext uri="{FF2B5EF4-FFF2-40B4-BE49-F238E27FC236}">
-                <a16:creationId xmlns:a16="http://schemas.microsoft.com/office/drawing/2014/main" id="{A978BE89-8A24-C73C-4BA7-A8206E501BD1}"/>
+                <a16:creationId xmlns:a16="http://schemas.microsoft.com/office/drawing/2014/main" id="{A0D18887-339A-9342-4398-C4A5269F11B2}"/>
               </a:ext>
             </a:extLst>
           </p:cNvPr>
-          <p:cNvSpPr txBox="1"/>
+          <p:cNvSpPr/>
           <p:nvPr/>
         </p:nvSpPr>
         <p:spPr>
           <a:xfrm>
-            <a:off x="396240" y="5293584"/>
-            <a:ext cx="10749280" cy="461665"/>
+            <a:off x="2108199" y="3104993"/>
+            <a:ext cx="1358538" cy="325120"/>
           </a:xfrm>
-          <a:prstGeom prst="rect">
+          <a:prstGeom prst="ellipse">
             <a:avLst/>
           </a:prstGeom>
           <a:noFill/>
+          <a:ln w="38100">
+            <a:solidFill>
+              <a:srgbClr val="FF0000"/>
+            </a:solidFill>
+          </a:ln>
         </p:spPr>
+        <p:style>
+          <a:lnRef idx="2">
+            <a:schemeClr val="accent1">
+              <a:shade val="15000"/>
+            </a:schemeClr>
+          </a:lnRef>
+          <a:fillRef idx="1">
+            <a:schemeClr val="accent1"/>
+          </a:fillRef>
+          <a:effectRef idx="0">
+            <a:schemeClr val="accent1"/>
+          </a:effectRef>
+          <a:fontRef idx="minor">
+            <a:schemeClr val="lt1"/>
+          </a:fontRef>
+        </p:style>
         <p:txBody>
-          <a:bodyPr wrap="square">
-            <a:spAutoFit/>
-          </a:bodyPr>
+          <a:bodyPr rtlCol="0" anchor="ctr"/>
           <a:lstStyle/>
           <a:p>
-            <a:pPr marL="0" indent="0">
-              <a:buNone/>
-            </a:pPr>
-            <a:r>
-              <a:rPr lang="en-GB" sz="2400" dirty="0">
-                <a:latin typeface="Helvetica" panose="020B0604020202020204" pitchFamily="34" charset="0"/>
-                <a:cs typeface="Helvetica" panose="020B0604020202020204" pitchFamily="34" charset="0"/>
-              </a:rPr>
-              <a:t>Step 3. Unzip folder, then double-click </a:t>
-            </a:r>
-            <a:r>
-              <a:rPr lang="en-GB" sz="2400" b="1" dirty="0">
-                <a:latin typeface="Helvetica" panose="020B0604020202020204" pitchFamily="34" charset="0"/>
-                <a:cs typeface="Helvetica" panose="020B0604020202020204" pitchFamily="34" charset="0"/>
-              </a:rPr>
-              <a:t>multiverse-</a:t>
-            </a:r>
-            <a:r>
-              <a:rPr lang="en-GB" sz="2400" b="1" dirty="0" err="1">
-                <a:latin typeface="Helvetica" panose="020B0604020202020204" pitchFamily="34" charset="0"/>
-                <a:cs typeface="Helvetica" panose="020B0604020202020204" pitchFamily="34" charset="0"/>
-              </a:rPr>
-              <a:t>workshop.Rproj</a:t>
-            </a:r>
-            <a:r>
-              <a:rPr lang="en-GB" sz="2400" dirty="0">
-                <a:latin typeface="Helvetica" panose="020B0604020202020204" pitchFamily="34" charset="0"/>
-                <a:cs typeface="Helvetica" panose="020B0604020202020204" pitchFamily="34" charset="0"/>
-              </a:rPr>
-              <a:t> </a:t>
-            </a:r>
-            <a:endParaRPr lang="LID4096" sz="2400" dirty="0">
-              <a:latin typeface="Helvetica" panose="020B0604020202020204" pitchFamily="34" charset="0"/>
-              <a:cs typeface="Helvetica" panose="020B0604020202020204" pitchFamily="34" charset="0"/>
-            </a:endParaRPr>
+            <a:pPr algn="ctr"/>
+            <a:endParaRPr lang="LID4096"/>
           </a:p>
         </p:txBody>
       </p:sp>

</xml_diff>

<commit_message>
Add folder for Mainz workshop
</commit_message>
<xml_diff>
--- a/UU_april_2024/intro-to-multiverse.pptx
+++ b/UU_april_2024/intro-to-multiverse.pptx
@@ -7993,12 +7993,33 @@
               <a:t>Go to: </a:t>
             </a:r>
             <a:r>
-              <a:rPr lang="LID4096" sz="2400" dirty="0">
+              <a:rPr lang="LID4096" sz="2400" b="1" strike="sngStrike" dirty="0">
+                <a:latin typeface="Helvetica" panose="020B0604020202020204" pitchFamily="34" charset="0"/>
+                <a:cs typeface="Helvetica" panose="020B0604020202020204" pitchFamily="34" charset="0"/>
+                <a:hlinkClick r:id="rId2"/>
+              </a:rPr>
+              <a:t>https://osf.io/8ecdz/</a:t>
+            </a:r>
+            <a:endParaRPr lang="en-GB" sz="2400" b="1" strike="sngStrike" dirty="0">
+              <a:latin typeface="Helvetica" panose="020B0604020202020204" pitchFamily="34" charset="0"/>
+              <a:cs typeface="Helvetica" panose="020B0604020202020204" pitchFamily="34" charset="0"/>
+            </a:endParaRPr>
+          </a:p>
+          <a:p>
+            <a:pPr marL="0" indent="0">
+              <a:buNone/>
+            </a:pPr>
+            <a:r>
+              <a:rPr lang="en-GB" sz="2400" b="1" dirty="0">
                 <a:latin typeface="Helvetica" panose="020B0604020202020204" pitchFamily="34" charset="0"/>
                 <a:cs typeface="Helvetica" panose="020B0604020202020204" pitchFamily="34" charset="0"/>
               </a:rPr>
-              <a:t>https://osf.io/8ecdz/</a:t>
-            </a:r>
+              <a:t>https://github.com/StefanVermeent/multiverse-workshop/tree/main/UU_april_2024</a:t>
+            </a:r>
+            <a:endParaRPr lang="LID4096" sz="2400" b="1" dirty="0">
+              <a:latin typeface="Helvetica" panose="020B0604020202020204" pitchFamily="34" charset="0"/>
+              <a:cs typeface="Helvetica" panose="020B0604020202020204" pitchFamily="34" charset="0"/>
+            </a:endParaRPr>
           </a:p>
           <a:p>
             <a:pPr marL="0" indent="0">
@@ -8351,7 +8372,7 @@
         <p:spPr>
           <a:xfrm>
             <a:off x="345440" y="277614"/>
-            <a:ext cx="6096000" cy="461665"/>
+            <a:ext cx="11019246" cy="461665"/>
           </a:xfrm>
           <a:prstGeom prst="rect">
             <a:avLst/>
@@ -8372,15 +8393,12 @@
                 <a:latin typeface="Helvetica" panose="020B0604020202020204" pitchFamily="34" charset="0"/>
                 <a:cs typeface="Helvetica" panose="020B0604020202020204" pitchFamily="34" charset="0"/>
               </a:rPr>
-              <a:t>Step 1. Go to: </a:t>
-            </a:r>
-            <a:r>
-              <a:rPr lang="LID4096" sz="2400" dirty="0">
-                <a:latin typeface="Helvetica" panose="020B0604020202020204" pitchFamily="34" charset="0"/>
-                <a:cs typeface="Helvetica" panose="020B0604020202020204" pitchFamily="34" charset="0"/>
-              </a:rPr>
-              <a:t>https://osf.io/8ecdz/</a:t>
-            </a:r>
+              <a:t>Step 1. Go to: https://github.com/StefanVermeent/multiverse-workshop</a:t>
+            </a:r>
+            <a:endParaRPr lang="LID4096" sz="2400" dirty="0">
+              <a:latin typeface="Helvetica" panose="020B0604020202020204" pitchFamily="34" charset="0"/>
+              <a:cs typeface="Helvetica" panose="020B0604020202020204" pitchFamily="34" charset="0"/>
+            </a:endParaRPr>
           </a:p>
         </p:txBody>
       </p:sp>
@@ -8443,8 +8461,8 @@
         </p:nvSpPr>
         <p:spPr>
           <a:xfrm>
-            <a:off x="396240" y="5293584"/>
-            <a:ext cx="10749280" cy="461665"/>
+            <a:off x="396239" y="5293584"/>
+            <a:ext cx="11795761" cy="1200329"/>
           </a:xfrm>
           <a:prstGeom prst="rect">
             <a:avLst/>
@@ -8465,7 +8483,28 @@
                 <a:latin typeface="Helvetica" panose="020B0604020202020204" pitchFamily="34" charset="0"/>
                 <a:cs typeface="Helvetica" panose="020B0604020202020204" pitchFamily="34" charset="0"/>
               </a:rPr>
-              <a:t>Step 3. Unzip folder, then double-click </a:t>
+              <a:t>Step 3. Unzip folder and navigate to ‘UU_April_2024’ folder</a:t>
+            </a:r>
+          </a:p>
+          <a:p>
+            <a:pPr marL="0" indent="0">
+              <a:buNone/>
+            </a:pPr>
+            <a:endParaRPr lang="en-GB" sz="2400" dirty="0">
+              <a:latin typeface="Helvetica" panose="020B0604020202020204" pitchFamily="34" charset="0"/>
+              <a:cs typeface="Helvetica" panose="020B0604020202020204" pitchFamily="34" charset="0"/>
+            </a:endParaRPr>
+          </a:p>
+          <a:p>
+            <a:pPr marL="0" indent="0">
+              <a:buNone/>
+            </a:pPr>
+            <a:r>
+              <a:rPr lang="en-GB" sz="2400" dirty="0">
+                <a:latin typeface="Helvetica" panose="020B0604020202020204" pitchFamily="34" charset="0"/>
+                <a:cs typeface="Helvetica" panose="020B0604020202020204" pitchFamily="34" charset="0"/>
+              </a:rPr>
+              <a:t>Step 4. Double-click </a:t>
             </a:r>
             <a:r>
               <a:rPr lang="en-GB" sz="2400" b="1" dirty="0">
@@ -8497,10 +8536,10 @@
       </p:sp>
       <p:pic>
         <p:nvPicPr>
-          <p:cNvPr id="6" name="Picture 5">
+          <p:cNvPr id="3" name="Picture 2">
             <a:extLst>
               <a:ext uri="{FF2B5EF4-FFF2-40B4-BE49-F238E27FC236}">
-                <a16:creationId xmlns:a16="http://schemas.microsoft.com/office/drawing/2014/main" id="{02647696-0B07-5D1A-D0B7-ED4D2A7A72A4}"/>
+                <a16:creationId xmlns:a16="http://schemas.microsoft.com/office/drawing/2014/main" id="{3A45990C-21AE-96E8-5B3E-826374C22E29}"/>
               </a:ext>
             </a:extLst>
           </p:cNvPr>
@@ -8517,8 +8556,8 @@
         </p:blipFill>
         <p:spPr>
           <a:xfrm>
-            <a:off x="1837683" y="1035574"/>
-            <a:ext cx="5242386" cy="4085065"/>
+            <a:off x="1873776" y="874829"/>
+            <a:ext cx="9135327" cy="4219686"/>
           </a:xfrm>
           <a:prstGeom prst="rect">
             <a:avLst/>
@@ -8539,8 +8578,8 @@
         </p:nvSpPr>
         <p:spPr>
           <a:xfrm>
-            <a:off x="1963057" y="1551203"/>
-            <a:ext cx="1503680" cy="325120"/>
+            <a:off x="7694022" y="1344948"/>
+            <a:ext cx="973183" cy="392411"/>
           </a:xfrm>
           <a:prstGeom prst="ellipse">
             <a:avLst/>
@@ -8591,8 +8630,8 @@
         </p:nvSpPr>
         <p:spPr>
           <a:xfrm>
-            <a:off x="2108199" y="3104993"/>
-            <a:ext cx="1358538" cy="325120"/>
+            <a:off x="5584371" y="3732197"/>
+            <a:ext cx="1116875" cy="325120"/>
           </a:xfrm>
           <a:prstGeom prst="ellipse">
             <a:avLst/>

</xml_diff>